<commit_message>
added variable = variable example
</commit_message>
<xml_diff>
--- a/Python Day 1.pptx
+++ b/Python Day 1.pptx
@@ -8694,7 +8694,7 @@
           <a:p>
             <a:fld id="{2632081B-9E57-490D-98F0-0935C15B415A}" type="datetimeFigureOut">
               <a:rPr lang="en-US" smtClean="0"/>
-              <a:t>1/26/2018</a:t>
+              <a:t>2/1/2018</a:t>
             </a:fld>
             <a:endParaRPr lang="en-US"/>
           </a:p>
@@ -9244,7 +9244,7 @@
           <a:p>
             <a:fld id="{1160EA64-D806-43AC-9DF2-F8C432F32B4C}" type="datetimeFigureOut">
               <a:rPr lang="en-US" dirty="0"/>
-              <a:t>1/26/2018</a:t>
+              <a:t>2/1/2018</a:t>
             </a:fld>
             <a:endParaRPr lang="en-US" dirty="0"/>
           </a:p>
@@ -9410,7 +9410,7 @@
           <a:p>
             <a:fld id="{E9F9C37B-1D36-470B-8223-D6C91242EC14}" type="datetimeFigureOut">
               <a:rPr lang="en-US" dirty="0"/>
-              <a:t>1/26/2018</a:t>
+              <a:t>2/1/2018</a:t>
             </a:fld>
             <a:endParaRPr lang="en-US" dirty="0"/>
           </a:p>
@@ -9585,7 +9585,7 @@
           <a:p>
             <a:fld id="{67C6F52A-A82B-47A2-A83A-8C4C91F2D59F}" type="datetimeFigureOut">
               <a:rPr lang="en-US" dirty="0"/>
-              <a:t>1/26/2018</a:t>
+              <a:t>2/1/2018</a:t>
             </a:fld>
             <a:endParaRPr lang="en-US" dirty="0"/>
           </a:p>
@@ -9750,7 +9750,7 @@
           <a:p>
             <a:fld id="{F070A7B3-6521-4DCA-87E5-044747A908C1}" type="datetimeFigureOut">
               <a:rPr lang="en-US" dirty="0"/>
-              <a:t>1/26/2018</a:t>
+              <a:t>2/1/2018</a:t>
             </a:fld>
             <a:endParaRPr lang="en-US" dirty="0"/>
           </a:p>
@@ -10014,7 +10014,7 @@
           <a:p>
             <a:fld id="{1160EA64-D806-43AC-9DF2-F8C432F32B4C}" type="datetimeFigureOut">
               <a:rPr lang="en-US" dirty="0"/>
-              <a:t>1/26/2018</a:t>
+              <a:t>2/1/2018</a:t>
             </a:fld>
             <a:endParaRPr lang="en-US" dirty="0"/>
           </a:p>
@@ -10242,7 +10242,7 @@
           <a:p>
             <a:fld id="{AB134690-1557-4C89-A502-4959FE7FAD70}" type="datetimeFigureOut">
               <a:rPr lang="en-US" dirty="0"/>
-              <a:t>1/26/2018</a:t>
+              <a:t>2/1/2018</a:t>
             </a:fld>
             <a:endParaRPr lang="en-US" dirty="0"/>
           </a:p>
@@ -10596,7 +10596,7 @@
           <a:p>
             <a:fld id="{4F7D4976-E339-4826-83B7-FBD03F55ECF8}" type="datetimeFigureOut">
               <a:rPr lang="en-US" dirty="0"/>
-              <a:t>1/26/2018</a:t>
+              <a:t>2/1/2018</a:t>
             </a:fld>
             <a:endParaRPr lang="en-US" dirty="0"/>
           </a:p>
@@ -10732,7 +10732,7 @@
           <a:p>
             <a:fld id="{E1037C31-9E7A-4F99-8774-A0E530DE1A42}" type="datetimeFigureOut">
               <a:rPr lang="en-US" dirty="0"/>
-              <a:t>1/26/2018</a:t>
+              <a:t>2/1/2018</a:t>
             </a:fld>
             <a:endParaRPr lang="en-US" dirty="0"/>
           </a:p>
@@ -10822,7 +10822,7 @@
           <a:p>
             <a:fld id="{C278504F-A551-4DE0-9316-4DCD1D8CC752}" type="datetimeFigureOut">
               <a:rPr lang="en-US" dirty="0"/>
-              <a:t>1/26/2018</a:t>
+              <a:t>2/1/2018</a:t>
             </a:fld>
             <a:endParaRPr lang="en-US" dirty="0"/>
           </a:p>
@@ -11174,7 +11174,7 @@
           <a:p>
             <a:fld id="{D1BE4249-C0D0-4B06-8692-E8BB871AF643}" type="datetimeFigureOut">
               <a:rPr lang="en-US" dirty="0"/>
-              <a:t>1/26/2018</a:t>
+              <a:t>2/1/2018</a:t>
             </a:fld>
             <a:endParaRPr lang="en-US" dirty="0"/>
           </a:p>
@@ -11526,7 +11526,7 @@
           <a:p>
             <a:fld id="{042B0DB6-F5C7-45FB-8CF3-31B45F9C2DAC}" type="datetimeFigureOut">
               <a:rPr lang="en-US" dirty="0"/>
-              <a:t>1/26/2018</a:t>
+              <a:t>2/1/2018</a:t>
             </a:fld>
             <a:endParaRPr lang="en-US" dirty="0"/>
           </a:p>
@@ -11762,7 +11762,7 @@
           <a:p>
             <a:fld id="{1160EA64-D806-43AC-9DF2-F8C432F32B4C}" type="datetimeFigureOut">
               <a:rPr lang="en-US" dirty="0"/>
-              <a:t>1/26/2018</a:t>
+              <a:t>2/1/2018</a:t>
             </a:fld>
             <a:endParaRPr lang="en-US" dirty="0"/>
           </a:p>
@@ -12765,7 +12765,9 @@
         </p:nvSpPr>
         <p:spPr/>
         <p:txBody>
-          <a:bodyPr/>
+          <a:bodyPr>
+            <a:normAutofit lnSpcReduction="10000"/>
+          </a:bodyPr>
           <a:lstStyle/>
           <a:p>
             <a:r>
@@ -12824,6 +12826,48 @@
               </a:rPr>
               <a:t>pi = 3.14</a:t>
             </a:r>
+          </a:p>
+          <a:p>
+            <a:pPr lvl="1"/>
+            <a:r>
+              <a:rPr lang="en-US" dirty="0" err="1">
+                <a:latin typeface="Arial" panose="020B0604020202020204" pitchFamily="34" charset="0"/>
+                <a:cs typeface="Arial" panose="020B0604020202020204" pitchFamily="34" charset="0"/>
+              </a:rPr>
+              <a:t>num</a:t>
+            </a:r>
+            <a:r>
+              <a:rPr lang="en-US" dirty="0">
+                <a:latin typeface="Arial" panose="020B0604020202020204" pitchFamily="34" charset="0"/>
+                <a:cs typeface="Arial" panose="020B0604020202020204" pitchFamily="34" charset="0"/>
+              </a:rPr>
+              <a:t> </a:t>
+            </a:r>
+            <a:r>
+              <a:rPr lang="en-US">
+                <a:latin typeface="Arial" panose="020B0604020202020204" pitchFamily="34" charset="0"/>
+                <a:cs typeface="Arial" panose="020B0604020202020204" pitchFamily="34" charset="0"/>
+              </a:rPr>
+              <a:t>= size</a:t>
+            </a:r>
+            <a:endParaRPr lang="en-US" dirty="0">
+              <a:latin typeface="Arial" panose="020B0604020202020204" pitchFamily="34" charset="0"/>
+              <a:cs typeface="Arial" panose="020B0604020202020204" pitchFamily="34" charset="0"/>
+            </a:endParaRPr>
+          </a:p>
+          <a:p>
+            <a:pPr lvl="1"/>
+            <a:endParaRPr lang="en-US" dirty="0">
+              <a:latin typeface="Arial" panose="020B0604020202020204" pitchFamily="34" charset="0"/>
+              <a:cs typeface="Arial" panose="020B0604020202020204" pitchFamily="34" charset="0"/>
+            </a:endParaRPr>
+          </a:p>
+          <a:p>
+            <a:pPr lvl="1"/>
+            <a:endParaRPr lang="en-US" dirty="0">
+              <a:latin typeface="Arial" panose="020B0604020202020204" pitchFamily="34" charset="0"/>
+              <a:cs typeface="Arial" panose="020B0604020202020204" pitchFamily="34" charset="0"/>
+            </a:endParaRPr>
           </a:p>
         </p:txBody>
       </p:sp>

</xml_diff>